<commit_message>
refactoring works, ready to move from .ipynb to .py
</commit_message>
<xml_diff>
--- a/Textbooks/Emmy Noether.pptx
+++ b/Textbooks/Emmy Noether.pptx
@@ -505,44 +505,26 @@
               <a:t># Name</a:t>
             </a:r>
             <a:br/>
-            <a:br/>
             <a:r>
               <a:t>Emmy Noether</a:t>
             </a:r>
             <a:br/>
             <a:br/>
             <a:r>
-              <a:t>  </a:t>
+              <a:t># Textbook</a:t>
+            </a:r>
+            <a:br/>
+            <a:r>
+              <a:t>Knight, Physics for Scientists and Engineers: A Strategic Approach with Modern Physics, 3rd Edition, Chapter 10</a:t>
             </a:r>
             <a:br/>
             <a:br/>
             <a:r>
-              <a:t># Textbook</a:t>
+              <a:t># Contributor</a:t>
             </a:r>
             <a:br/>
-            <a:br/>
-            <a:r>
-              <a:t>Knight, 3rd edition, Chapter 10</a:t>
-            </a:r>
-            <a:br/>
-            <a:br/>
-            <a:r>
-              <a:t>  </a:t>
-            </a:r>
-            <a:br/>
-            <a:br/>
-            <a:r>
-              <a:t># Contributor</a:t>
-            </a:r>
-            <a:br/>
-            <a:br/>
             <a:r>
               <a:t>Mai Hoang</a:t>
-            </a:r>
-            <a:br/>
-            <a:br/>
-            <a:r>
-              <a:t>  </a:t>
             </a:r>
             <a:br/>
             <a:br/>

</xml_diff>